<commit_message>
Alter top 10 sls people
</commit_message>
<xml_diff>
--- a/bannerRec_20161031.pptx
+++ b/bannerRec_20161031.pptx
@@ -3097,11 +3097,7 @@
           <a:p>
             <a:r>
               <a:rPr lang="en-US" sz="3200" dirty="0" smtClean="0"/>
-              <a:t>Banner </a:t>
-            </a:r>
-            <a:r>
-              <a:rPr lang="en-US" sz="3200" dirty="0" smtClean="0"/>
-              <a:t>Sales &amp; Opportunities</a:t>
+              <a:t>Banner Sales &amp; Opportunities</a:t>
             </a:r>
             <a:endParaRPr lang="en-US" sz="1800" dirty="0"/>
           </a:p>
@@ -4431,15 +4427,7 @@
           <a:p>
             <a:r>
               <a:rPr lang="en-US" dirty="0" smtClean="0"/>
-              <a:t>Who </a:t>
-            </a:r>
-            <a:r>
-              <a:rPr lang="en-US" dirty="0" smtClean="0"/>
-              <a:t>in the BCG group can sell the most YW-x21 Details</a:t>
-            </a:r>
-            <a:r>
-              <a:rPr lang="en-US" dirty="0" smtClean="0"/>
-              <a:t>?</a:t>
+              <a:t>Who in the BCG group can sell the most YW-x21 Details?</a:t>
             </a:r>
           </a:p>
         </p:txBody>
@@ -5405,11 +5393,7 @@
           <a:p>
             <a:r>
               <a:rPr lang="en-US" dirty="0" smtClean="0"/>
-              <a:t>Who can sell the most inventory with Geo only targeting</a:t>
-            </a:r>
-            <a:r>
-              <a:rPr lang="en-US" dirty="0" smtClean="0"/>
-              <a:t>?</a:t>
+              <a:t>Who can sell the most inventory with Geo only targeting?</a:t>
             </a:r>
           </a:p>
           <a:p>
@@ -5440,7 +5424,6 @@
               <a:rPr lang="en-US" dirty="0" smtClean="0"/>
               <a:t>If selling a boat, banner sales are probably not the best</a:t>
             </a:r>
-            <a:endParaRPr lang="en-US" dirty="0" smtClean="0"/>
           </a:p>
         </p:txBody>
       </p:sp>
@@ -6003,7 +5986,7 @@
         </p:nvSpPr>
         <p:spPr>
           <a:xfrm>
-            <a:off x="228600" y="5334000"/>
+            <a:off x="762000" y="5333999"/>
             <a:ext cx="8763000" cy="457201"/>
           </a:xfrm>
           <a:prstGeom prst="rect">
@@ -6165,7 +6148,7 @@
       </p:sp>
       <p:pic>
         <p:nvPicPr>
-          <p:cNvPr id="5" name="Picture 4"/>
+          <p:cNvPr id="3" name="Picture 2"/>
           <p:cNvPicPr>
             <a:picLocks noChangeAspect="1"/>
           </p:cNvPicPr>
@@ -6179,8 +6162,8 @@
         </p:blipFill>
         <p:spPr>
           <a:xfrm>
-            <a:off x="368140" y="1524000"/>
-            <a:ext cx="8005744" cy="3657600"/>
+            <a:off x="762000" y="1308790"/>
+            <a:ext cx="7467602" cy="3897878"/>
           </a:xfrm>
           <a:prstGeom prst="rect">
             <a:avLst/>
@@ -7307,19 +7290,7 @@
               <a:rPr lang="en-US" sz="2700" dirty="0" smtClean="0">
                 <a:latin typeface="+mn-lt"/>
               </a:rPr>
-              <a:t> (</a:t>
-            </a:r>
-            <a:r>
-              <a:rPr lang="en-US" sz="2700" dirty="0" smtClean="0">
-                <a:latin typeface="+mn-lt"/>
-              </a:rPr>
-              <a:t>network) </a:t>
-            </a:r>
-            <a:r>
-              <a:rPr lang="en-US" sz="2700" dirty="0" smtClean="0">
-                <a:latin typeface="+mn-lt"/>
-              </a:rPr>
-              <a:t>sold</a:t>
+              <a:t> (network) sold</a:t>
             </a:r>
             <a:endParaRPr lang="en-US" sz="2700" dirty="0">
               <a:latin typeface="+mn-lt"/>

</xml_diff>